<commit_message>
finished the first cut of the Lab Setup powerpoint
</commit_message>
<xml_diff>
--- a/Lab Setup.pptx
+++ b/Lab Setup.pptx
@@ -261,7 +261,7 @@
           <a:p>
             <a:fld id="{139DC687-16F3-45CC-95F4-8BE234AFA622}" type="datetimeFigureOut">
               <a:rPr lang="en-US" smtClean="0"/>
-              <a:t>4/28/2025</a:t>
+              <a:t>5/4/2025</a:t>
             </a:fld>
             <a:endParaRPr lang="en-US"/>
           </a:p>
@@ -459,7 +459,7 @@
           <a:p>
             <a:fld id="{139DC687-16F3-45CC-95F4-8BE234AFA622}" type="datetimeFigureOut">
               <a:rPr lang="en-US" smtClean="0"/>
-              <a:t>4/28/2025</a:t>
+              <a:t>5/4/2025</a:t>
             </a:fld>
             <a:endParaRPr lang="en-US"/>
           </a:p>
@@ -667,7 +667,7 @@
           <a:p>
             <a:fld id="{139DC687-16F3-45CC-95F4-8BE234AFA622}" type="datetimeFigureOut">
               <a:rPr lang="en-US" smtClean="0"/>
-              <a:t>4/28/2025</a:t>
+              <a:t>5/4/2025</a:t>
             </a:fld>
             <a:endParaRPr lang="en-US"/>
           </a:p>
@@ -865,7 +865,7 @@
           <a:p>
             <a:fld id="{139DC687-16F3-45CC-95F4-8BE234AFA622}" type="datetimeFigureOut">
               <a:rPr lang="en-US" smtClean="0"/>
-              <a:t>4/28/2025</a:t>
+              <a:t>5/4/2025</a:t>
             </a:fld>
             <a:endParaRPr lang="en-US"/>
           </a:p>
@@ -1140,7 +1140,7 @@
           <a:p>
             <a:fld id="{139DC687-16F3-45CC-95F4-8BE234AFA622}" type="datetimeFigureOut">
               <a:rPr lang="en-US" smtClean="0"/>
-              <a:t>4/28/2025</a:t>
+              <a:t>5/4/2025</a:t>
             </a:fld>
             <a:endParaRPr lang="en-US"/>
           </a:p>
@@ -1405,7 +1405,7 @@
           <a:p>
             <a:fld id="{139DC687-16F3-45CC-95F4-8BE234AFA622}" type="datetimeFigureOut">
               <a:rPr lang="en-US" smtClean="0"/>
-              <a:t>4/28/2025</a:t>
+              <a:t>5/4/2025</a:t>
             </a:fld>
             <a:endParaRPr lang="en-US"/>
           </a:p>
@@ -1817,7 +1817,7 @@
           <a:p>
             <a:fld id="{139DC687-16F3-45CC-95F4-8BE234AFA622}" type="datetimeFigureOut">
               <a:rPr lang="en-US" smtClean="0"/>
-              <a:t>4/28/2025</a:t>
+              <a:t>5/4/2025</a:t>
             </a:fld>
             <a:endParaRPr lang="en-US"/>
           </a:p>
@@ -1958,7 +1958,7 @@
           <a:p>
             <a:fld id="{139DC687-16F3-45CC-95F4-8BE234AFA622}" type="datetimeFigureOut">
               <a:rPr lang="en-US" smtClean="0"/>
-              <a:t>4/28/2025</a:t>
+              <a:t>5/4/2025</a:t>
             </a:fld>
             <a:endParaRPr lang="en-US"/>
           </a:p>
@@ -2071,7 +2071,7 @@
           <a:p>
             <a:fld id="{139DC687-16F3-45CC-95F4-8BE234AFA622}" type="datetimeFigureOut">
               <a:rPr lang="en-US" smtClean="0"/>
-              <a:t>4/28/2025</a:t>
+              <a:t>5/4/2025</a:t>
             </a:fld>
             <a:endParaRPr lang="en-US"/>
           </a:p>
@@ -2382,7 +2382,7 @@
           <a:p>
             <a:fld id="{139DC687-16F3-45CC-95F4-8BE234AFA622}" type="datetimeFigureOut">
               <a:rPr lang="en-US" smtClean="0"/>
-              <a:t>4/28/2025</a:t>
+              <a:t>5/4/2025</a:t>
             </a:fld>
             <a:endParaRPr lang="en-US"/>
           </a:p>
@@ -2670,7 +2670,7 @@
           <a:p>
             <a:fld id="{139DC687-16F3-45CC-95F4-8BE234AFA622}" type="datetimeFigureOut">
               <a:rPr lang="en-US" smtClean="0"/>
-              <a:t>4/28/2025</a:t>
+              <a:t>5/4/2025</a:t>
             </a:fld>
             <a:endParaRPr lang="en-US"/>
           </a:p>
@@ -2911,7 +2911,7 @@
           <a:p>
             <a:fld id="{139DC687-16F3-45CC-95F4-8BE234AFA622}" type="datetimeFigureOut">
               <a:rPr lang="en-US" smtClean="0"/>
-              <a:t>4/28/2025</a:t>
+              <a:t>5/4/2025</a:t>
             </a:fld>
             <a:endParaRPr lang="en-US"/>
           </a:p>
@@ -3351,7 +3351,7 @@
           <a:p>
             <a:r>
               <a:rPr lang="en-US" dirty="0"/>
-              <a:t>Requirements</a:t>
+              <a:t>Overall Requirements</a:t>
             </a:r>
           </a:p>
         </p:txBody>
@@ -3372,7 +3372,12 @@
             <p:ph idx="1"/>
           </p:nvPr>
         </p:nvSpPr>
-        <p:spPr/>
+        <p:spPr>
+          <a:xfrm>
+            <a:off x="838200" y="1825625"/>
+            <a:ext cx="11063140" cy="3788037"/>
+          </a:xfrm>
+        </p:spPr>
         <p:txBody>
           <a:bodyPr>
             <a:normAutofit/>
@@ -3381,39 +3386,135 @@
           <a:p>
             <a:r>
               <a:rPr lang="en-US" sz="2400" dirty="0"/>
-              <a:t>Lab zip (contains lab code and recordings)</a:t>
-            </a:r>
-          </a:p>
-          <a:p>
+              <a:t>Lab code - download zip from </a:t>
+            </a:r>
+            <a:r>
+              <a:rPr lang="en-US" sz="2400" dirty="0">
+                <a:hlinkClick r:id="rId2"/>
+              </a:rPr>
+              <a:t>https://tinyurl.com/adbfzip</a:t>
+            </a:r>
+            <a:endParaRPr lang="en-US" sz="2400" dirty="0"/>
+          </a:p>
+          <a:p>
+            <a:pPr lvl="1"/>
+            <a:r>
+              <a:rPr lang="en-US" sz="2000" dirty="0"/>
+              <a:t>It’s just an alias to download the latest code from our workshop repo- </a:t>
+            </a:r>
+          </a:p>
+          <a:p>
+            <a:pPr lvl="1"/>
+            <a:r>
+              <a:rPr lang="en-US" sz="2000" dirty="0">
+                <a:hlinkClick r:id="rId3"/>
+              </a:rPr>
+              <a:t>https://github.com/777arc/RADAR-2025-Beamforming-Labs</a:t>
+            </a:r>
+            <a:endParaRPr lang="en-US" sz="2000" dirty="0"/>
+          </a:p>
+          <a:p>
+            <a:r>
+              <a:rPr lang="en-US" sz="2400" b="1" dirty="0"/>
+              <a:t>Python 3</a:t>
+            </a:r>
             <a:r>
               <a:rPr lang="en-US" sz="2400" dirty="0"/>
-              <a:t>Python 3 with </a:t>
-            </a:r>
-            <a:r>
-              <a:rPr lang="en-US" sz="2400" dirty="0" err="1"/>
+              <a:t> with </a:t>
+            </a:r>
+            <a:r>
+              <a:rPr lang="en-US" sz="2400" b="1" dirty="0" err="1"/>
               <a:t>numpy</a:t>
             </a:r>
             <a:r>
               <a:rPr lang="en-US" sz="2400" dirty="0"/>
-              <a:t>, </a:t>
-            </a:r>
-            <a:r>
-              <a:rPr lang="en-US" sz="2400" dirty="0" err="1"/>
-              <a:t>scipy</a:t>
+              <a:t> and </a:t>
+            </a:r>
+            <a:r>
+              <a:rPr lang="en-US" sz="2400" b="1" dirty="0"/>
+              <a:t>matplotlib</a:t>
             </a:r>
             <a:r>
               <a:rPr lang="en-US" sz="2400" dirty="0"/>
-              <a:t>, matplotlib</a:t>
+              <a:t> installed</a:t>
             </a:r>
           </a:p>
           <a:p>
             <a:r>
               <a:rPr lang="en-US" sz="2400" dirty="0"/>
-              <a:t>Next slides provide steps to setup Python for Windows or browser-only</a:t>
-            </a:r>
-          </a:p>
-        </p:txBody>
-      </p:sp>
+              <a:t>Next slides show detailed install steps for 1) Windows and 2) Browser-only option</a:t>
+            </a:r>
+          </a:p>
+          <a:p>
+            <a:r>
+              <a:rPr lang="en-US" sz="2400" dirty="0"/>
+              <a:t>Marc will be available to help through text-based chat here </a:t>
+            </a:r>
+            <a:r>
+              <a:rPr lang="en-US" sz="2400" dirty="0">
+                <a:hlinkClick r:id="rId4"/>
+              </a:rPr>
+              <a:t>https://web.libera.chat/</a:t>
+            </a:r>
+            <a:endParaRPr lang="en-US" sz="2400" dirty="0"/>
+          </a:p>
+          <a:p>
+            <a:pPr lvl="1"/>
+            <a:r>
+              <a:rPr lang="en-US" sz="2000" dirty="0"/>
+              <a:t>Nick:   Your name/alias</a:t>
+            </a:r>
+          </a:p>
+          <a:p>
+            <a:pPr lvl="1"/>
+            <a:r>
+              <a:rPr lang="en-US" sz="2000" dirty="0"/>
+              <a:t>(Don’t check the password box)</a:t>
+            </a:r>
+          </a:p>
+          <a:p>
+            <a:pPr lvl="1"/>
+            <a:r>
+              <a:rPr lang="en-US" sz="2000" dirty="0"/>
+              <a:t>Channel:   </a:t>
+            </a:r>
+            <a:r>
+              <a:rPr lang="en-US" sz="2000" b="1" dirty="0"/>
+              <a:t>#radar2025</a:t>
+            </a:r>
+          </a:p>
+        </p:txBody>
+      </p:sp>
+      <p:pic>
+        <p:nvPicPr>
+          <p:cNvPr id="7" name="Picture 6">
+            <a:extLst>
+              <a:ext uri="{FF2B5EF4-FFF2-40B4-BE49-F238E27FC236}">
+                <a16:creationId xmlns:a16="http://schemas.microsoft.com/office/drawing/2014/main" id="{0F63058D-E440-45C4-BB40-7E1FEE6604F4}"/>
+              </a:ext>
+            </a:extLst>
+          </p:cNvPr>
+          <p:cNvPicPr>
+            <a:picLocks noChangeAspect="1"/>
+          </p:cNvPicPr>
+          <p:nvPr/>
+        </p:nvPicPr>
+        <p:blipFill>
+          <a:blip r:embed="rId5"/>
+          <a:stretch>
+            <a:fillRect/>
+          </a:stretch>
+        </p:blipFill>
+        <p:spPr>
+          <a:xfrm>
+            <a:off x="5000323" y="4260914"/>
+            <a:ext cx="2276981" cy="2531097"/>
+          </a:xfrm>
+          <a:prstGeom prst="rect">
+            <a:avLst/>
+          </a:prstGeom>
+        </p:spPr>
+      </p:pic>
     </p:spTree>
     <p:extLst>
       <p:ext uri="{BB962C8B-B14F-4D97-AF65-F5344CB8AC3E}">
@@ -3490,34 +3591,50 @@
         </p:nvSpPr>
         <p:spPr>
           <a:xfrm>
-            <a:off x="838200" y="1839765"/>
-            <a:ext cx="10515600" cy="4351338"/>
+            <a:off x="673519" y="1832949"/>
+            <a:ext cx="11353800" cy="4351338"/>
           </a:xfrm>
         </p:spPr>
         <p:txBody>
           <a:bodyPr>
-            <a:normAutofit/>
+            <a:normAutofit fontScale="92500" lnSpcReduction="10000"/>
           </a:bodyPr>
           <a:lstStyle/>
           <a:p>
+            <a:pPr marL="457200" indent="-457200">
+              <a:buFont typeface="+mj-lt"/>
+              <a:buAutoNum type="arabicPeriod"/>
+            </a:pPr>
             <a:r>
               <a:rPr lang="en-US" sz="2400" dirty="0"/>
               <a:t>Open Microsoft Store</a:t>
             </a:r>
           </a:p>
           <a:p>
+            <a:pPr marL="457200" indent="-457200">
+              <a:buFont typeface="+mj-lt"/>
+              <a:buAutoNum type="arabicPeriod"/>
+            </a:pPr>
             <a:r>
               <a:rPr lang="en-US" sz="2400" dirty="0"/>
               <a:t>Search for and install Python 3.12</a:t>
             </a:r>
           </a:p>
           <a:p>
+            <a:pPr marL="457200" indent="-457200">
+              <a:buFont typeface="+mj-lt"/>
+              <a:buAutoNum type="arabicPeriod"/>
+            </a:pPr>
             <a:r>
               <a:rPr lang="en-US" sz="2400" dirty="0"/>
               <a:t>Also search and install Visual Studio Code</a:t>
             </a:r>
           </a:p>
           <a:p>
+            <a:pPr marL="457200" indent="-457200">
+              <a:buFont typeface="+mj-lt"/>
+              <a:buAutoNum type="arabicPeriod"/>
+            </a:pPr>
             <a:r>
               <a:rPr lang="en-US" sz="2400" dirty="0"/>
               <a:t>Open </a:t>
@@ -3528,56 +3645,120 @@
             </a:r>
             <a:r>
               <a:rPr lang="en-US" sz="2400" dirty="0"/>
-              <a:t> app</a:t>
-            </a:r>
-          </a:p>
-          <a:p>
+              <a:t> desktop app</a:t>
+            </a:r>
+          </a:p>
+          <a:p>
+            <a:pPr marL="457200" indent="-457200">
+              <a:buFont typeface="+mj-lt"/>
+              <a:buAutoNum type="arabicPeriod"/>
+            </a:pPr>
             <a:r>
               <a:rPr lang="en-US" sz="2400" dirty="0"/>
-              <a:t>Unzip the lab zip</a:t>
-            </a:r>
-          </a:p>
-          <a:p>
+              <a:t>Download zip from </a:t>
+            </a:r>
+            <a:r>
+              <a:rPr lang="en-US" sz="2400" dirty="0">
+                <a:hlinkClick r:id="rId2"/>
+              </a:rPr>
+              <a:t>https://tinyurl.com/adbfzip</a:t>
+            </a:r>
             <a:r>
               <a:rPr lang="en-US" sz="2400" dirty="0"/>
-              <a:t>File &gt; Open Folder &gt; choose the unzipped folder</a:t>
-            </a:r>
-          </a:p>
-          <a:p>
+              <a:t> then unzip it</a:t>
+            </a:r>
+          </a:p>
+          <a:p>
+            <a:pPr lvl="1"/>
+            <a:r>
+              <a:rPr lang="en-US" sz="2000" dirty="0"/>
+              <a:t>Alias for our code on https://github.com/777arc/RADAR-2025-Beamforming-Labs</a:t>
+            </a:r>
+          </a:p>
+          <a:p>
+            <a:pPr marL="457200" indent="-457200">
+              <a:buFont typeface="+mj-lt"/>
+              <a:buAutoNum type="arabicPeriod"/>
+            </a:pPr>
+            <a:r>
+              <a:rPr lang="en-US" sz="2400" dirty="0"/>
+              <a:t>In </a:t>
+            </a:r>
+            <a:r>
+              <a:rPr lang="en-US" sz="2400" dirty="0" err="1"/>
+              <a:t>VSCode</a:t>
+            </a:r>
+            <a:r>
+              <a:rPr lang="en-US" sz="2400" dirty="0"/>
+              <a:t>, go to File &gt; Open Folder &gt; choose the unzipped folder</a:t>
+            </a:r>
+          </a:p>
+          <a:p>
+            <a:pPr marL="457200" indent="-457200">
+              <a:buFont typeface="+mj-lt"/>
+              <a:buAutoNum type="arabicPeriod"/>
+            </a:pPr>
             <a:r>
               <a:rPr lang="en-US" sz="2400" dirty="0"/>
               <a:t>Terminal &gt; New Terminal &gt; run the following command:</a:t>
             </a:r>
           </a:p>
           <a:p>
+            <a:pPr lvl="1"/>
+            <a:r>
+              <a:rPr lang="en-US" sz="2200" b="1" dirty="0"/>
+              <a:t>pip install </a:t>
+            </a:r>
+            <a:r>
+              <a:rPr lang="en-US" sz="2200" b="1" dirty="0" err="1"/>
+              <a:t>numpy</a:t>
+            </a:r>
+            <a:r>
+              <a:rPr lang="en-US" sz="2200" b="1" dirty="0"/>
+              <a:t> </a:t>
+            </a:r>
+            <a:r>
+              <a:rPr lang="en-US" sz="2200" b="1" dirty="0" err="1"/>
+              <a:t>scipy</a:t>
+            </a:r>
+            <a:r>
+              <a:rPr lang="en-US" sz="2200" b="1" dirty="0"/>
+              <a:t> matplotlib</a:t>
+            </a:r>
+          </a:p>
+          <a:p>
+            <a:pPr marL="457200" indent="-457200">
+              <a:buFont typeface="+mj-lt"/>
+              <a:buAutoNum type="arabicPeriod"/>
+            </a:pPr>
             <a:r>
               <a:rPr lang="en-US" sz="2400" dirty="0"/>
-              <a:t>pip install </a:t>
+              <a:t>We recommend using the .</a:t>
             </a:r>
             <a:r>
               <a:rPr lang="en-US" sz="2400" dirty="0" err="1"/>
-              <a:t>numpy</a:t>
+              <a:t>py</a:t>
             </a:r>
             <a:r>
               <a:rPr lang="en-US" sz="2400" dirty="0"/>
-              <a:t> </a:t>
-            </a:r>
-            <a:r>
-              <a:rPr lang="en-US" sz="2400" dirty="0" err="1"/>
-              <a:t>scipy</a:t>
-            </a:r>
+              <a:t> file for each lab</a:t>
+            </a:r>
+          </a:p>
+          <a:p>
+            <a:pPr marL="457200" indent="-457200">
+              <a:buFont typeface="+mj-lt"/>
+              <a:buAutoNum type="arabicPeriod"/>
+            </a:pPr>
             <a:r>
               <a:rPr lang="en-US" sz="2400" dirty="0"/>
-              <a:t> matplotlib</a:t>
-            </a:r>
-          </a:p>
-          <a:p>
-            <a:r>
-              <a:rPr lang="en-US" sz="2400" dirty="0"/>
-              <a:t>Play button on the top-right can be used to run a Python script</a:t>
-            </a:r>
-          </a:p>
-          <a:p>
+              <a:t>Play button on the top-right can be used to run each Python script</a:t>
+            </a:r>
+          </a:p>
+          <a:p>
+            <a:pPr marL="457200" indent="-457200">
+              <a:buFont typeface="+mj-lt"/>
+              <a:buAutoNum type="arabicPeriod"/>
+            </a:pPr>
             <a:endParaRPr lang="en-US" sz="2400" dirty="0"/>
           </a:p>
         </p:txBody>
@@ -3588,36 +3769,6 @@
             <a:extLst>
               <a:ext uri="{FF2B5EF4-FFF2-40B4-BE49-F238E27FC236}">
                 <a16:creationId xmlns:a16="http://schemas.microsoft.com/office/drawing/2014/main" id="{0D3824F9-0F96-4822-8ED7-4B11797FB9FC}"/>
-              </a:ext>
-            </a:extLst>
-          </p:cNvPr>
-          <p:cNvPicPr>
-            <a:picLocks noChangeAspect="1"/>
-          </p:cNvPicPr>
-          <p:nvPr/>
-        </p:nvPicPr>
-        <p:blipFill>
-          <a:blip r:embed="rId2"/>
-          <a:stretch>
-            <a:fillRect/>
-          </a:stretch>
-        </p:blipFill>
-        <p:spPr>
-          <a:xfrm>
-            <a:off x="3935862" y="1563426"/>
-            <a:ext cx="571088" cy="633768"/>
-          </a:xfrm>
-          <a:prstGeom prst="rect">
-            <a:avLst/>
-          </a:prstGeom>
-        </p:spPr>
-      </p:pic>
-      <p:pic>
-        <p:nvPicPr>
-          <p:cNvPr id="7" name="Picture 6">
-            <a:extLst>
-              <a:ext uri="{FF2B5EF4-FFF2-40B4-BE49-F238E27FC236}">
-                <a16:creationId xmlns:a16="http://schemas.microsoft.com/office/drawing/2014/main" id="{2AC30A73-3513-4F3B-B714-DF65082F1C09}"/>
               </a:ext>
             </a:extLst>
           </p:cNvPr>
@@ -3634,8 +3785,8 @@
         </p:blipFill>
         <p:spPr>
           <a:xfrm>
-            <a:off x="5402491" y="1839765"/>
-            <a:ext cx="3001504" cy="728490"/>
+            <a:off x="3725313" y="1685167"/>
+            <a:ext cx="456412" cy="506506"/>
           </a:xfrm>
           <a:prstGeom prst="rect">
             <a:avLst/>
@@ -3644,10 +3795,10 @@
       </p:pic>
       <p:pic>
         <p:nvPicPr>
-          <p:cNvPr id="9" name="Picture 8">
-            <a:extLst>
-              <a:ext uri="{FF2B5EF4-FFF2-40B4-BE49-F238E27FC236}">
-                <a16:creationId xmlns:a16="http://schemas.microsoft.com/office/drawing/2014/main" id="{66B30288-A7F3-4B57-8A32-8B7846C70719}"/>
+          <p:cNvPr id="7" name="Picture 6">
+            <a:extLst>
+              <a:ext uri="{FF2B5EF4-FFF2-40B4-BE49-F238E27FC236}">
+                <a16:creationId xmlns:a16="http://schemas.microsoft.com/office/drawing/2014/main" id="{2AC30A73-3513-4F3B-B714-DF65082F1C09}"/>
               </a:ext>
             </a:extLst>
           </p:cNvPr>
@@ -3664,14 +3815,118 @@
         </p:blipFill>
         <p:spPr>
           <a:xfrm>
-            <a:off x="6388126" y="2694418"/>
-            <a:ext cx="3111556" cy="807693"/>
+            <a:off x="5069924" y="1898427"/>
+            <a:ext cx="2438651" cy="591881"/>
           </a:xfrm>
           <a:prstGeom prst="rect">
             <a:avLst/>
           </a:prstGeom>
         </p:spPr>
       </p:pic>
+      <p:pic>
+        <p:nvPicPr>
+          <p:cNvPr id="9" name="Picture 8">
+            <a:extLst>
+              <a:ext uri="{FF2B5EF4-FFF2-40B4-BE49-F238E27FC236}">
+                <a16:creationId xmlns:a16="http://schemas.microsoft.com/office/drawing/2014/main" id="{66B30288-A7F3-4B57-8A32-8B7846C70719}"/>
+              </a:ext>
+            </a:extLst>
+          </p:cNvPr>
+          <p:cNvPicPr>
+            <a:picLocks noChangeAspect="1"/>
+          </p:cNvPicPr>
+          <p:nvPr/>
+        </p:nvPicPr>
+        <p:blipFill>
+          <a:blip r:embed="rId5"/>
+          <a:stretch>
+            <a:fillRect/>
+          </a:stretch>
+        </p:blipFill>
+        <p:spPr>
+          <a:xfrm>
+            <a:off x="6096000" y="2589719"/>
+            <a:ext cx="2613402" cy="678383"/>
+          </a:xfrm>
+          <a:prstGeom prst="rect">
+            <a:avLst/>
+          </a:prstGeom>
+        </p:spPr>
+      </p:pic>
+      <p:pic>
+        <p:nvPicPr>
+          <p:cNvPr id="6" name="Picture 5">
+            <a:extLst>
+              <a:ext uri="{FF2B5EF4-FFF2-40B4-BE49-F238E27FC236}">
+                <a16:creationId xmlns:a16="http://schemas.microsoft.com/office/drawing/2014/main" id="{CE7092E1-B60A-4D1D-A626-B5242F22AD03}"/>
+              </a:ext>
+            </a:extLst>
+          </p:cNvPr>
+          <p:cNvPicPr>
+            <a:picLocks noChangeAspect="1"/>
+          </p:cNvPicPr>
+          <p:nvPr/>
+        </p:nvPicPr>
+        <p:blipFill>
+          <a:blip r:embed="rId6"/>
+          <a:stretch>
+            <a:fillRect/>
+          </a:stretch>
+        </p:blipFill>
+        <p:spPr>
+          <a:xfrm>
+            <a:off x="9463268" y="2589719"/>
+            <a:ext cx="2564051" cy="4182181"/>
+          </a:xfrm>
+          <a:prstGeom prst="rect">
+            <a:avLst/>
+          </a:prstGeom>
+        </p:spPr>
+      </p:pic>
+      <p:cxnSp>
+        <p:nvCxnSpPr>
+          <p:cNvPr id="10" name="Straight Arrow Connector 9">
+            <a:extLst>
+              <a:ext uri="{FF2B5EF4-FFF2-40B4-BE49-F238E27FC236}">
+                <a16:creationId xmlns:a16="http://schemas.microsoft.com/office/drawing/2014/main" id="{C81C1BD5-F865-4F33-9B55-6A7DCD216B1E}"/>
+              </a:ext>
+            </a:extLst>
+          </p:cNvPr>
+          <p:cNvCxnSpPr>
+            <a:cxnSpLocks/>
+          </p:cNvCxnSpPr>
+          <p:nvPr/>
+        </p:nvCxnSpPr>
+        <p:spPr>
+          <a:xfrm flipH="1">
+            <a:off x="10444902" y="3700019"/>
+            <a:ext cx="391211" cy="84841"/>
+          </a:xfrm>
+          <a:prstGeom prst="straightConnector1">
+            <a:avLst/>
+          </a:prstGeom>
+          <a:ln w="38100">
+            <a:solidFill>
+              <a:srgbClr val="FF0000"/>
+            </a:solidFill>
+            <a:tailEnd type="triangle"/>
+          </a:ln>
+        </p:spPr>
+        <p:style>
+          <a:lnRef idx="1">
+            <a:schemeClr val="accent1"/>
+          </a:lnRef>
+          <a:fillRef idx="0">
+            <a:schemeClr val="accent1"/>
+          </a:fillRef>
+          <a:effectRef idx="0">
+            <a:schemeClr val="accent1"/>
+          </a:effectRef>
+          <a:fontRef idx="minor">
+            <a:schemeClr val="tx1"/>
+          </a:fontRef>
+        </p:style>
+      </p:cxnSp>
     </p:spTree>
     <p:extLst>
       <p:ext uri="{BB962C8B-B14F-4D97-AF65-F5344CB8AC3E}">
@@ -3718,7 +3973,12 @@
             <p:ph type="title"/>
           </p:nvPr>
         </p:nvSpPr>
-        <p:spPr/>
+        <p:spPr>
+          <a:xfrm>
+            <a:off x="800492" y="124742"/>
+            <a:ext cx="10515600" cy="832080"/>
+          </a:xfrm>
+        </p:spPr>
         <p:txBody>
           <a:bodyPr/>
           <a:lstStyle/>
@@ -3746,77 +4006,213 @@
             <p:ph idx="1"/>
           </p:nvPr>
         </p:nvSpPr>
-        <p:spPr/>
+        <p:spPr>
+          <a:xfrm>
+            <a:off x="578963" y="1239625"/>
+            <a:ext cx="11284670" cy="5425126"/>
+          </a:xfrm>
+        </p:spPr>
         <p:txBody>
           <a:bodyPr>
-            <a:normAutofit/>
+            <a:normAutofit fontScale="92500" lnSpcReduction="10000"/>
           </a:bodyPr>
           <a:lstStyle/>
           <a:p>
+            <a:pPr marL="0" indent="0">
+              <a:buNone/>
+            </a:pPr>
+            <a:r>
+              <a:rPr lang="en-US" sz="2400" i="1" dirty="0"/>
+              <a:t>If you don’t want to (or can’t) install anything on your laptop, use this method</a:t>
+            </a:r>
+          </a:p>
+          <a:p>
+            <a:pPr marL="457200" indent="-457200">
+              <a:buFont typeface="+mj-lt"/>
+              <a:buAutoNum type="arabicPeriod"/>
+            </a:pPr>
             <a:r>
               <a:rPr lang="en-US" sz="2400" dirty="0"/>
-              <a:t>In a browser go to </a:t>
-            </a:r>
-            <a:r>
-              <a:rPr lang="en-US" sz="2400" dirty="0">
+              <a:t>Log into your GitHub account, or create one if you don’t already have one, at github.com</a:t>
+            </a:r>
+          </a:p>
+          <a:p>
+            <a:pPr marL="457200" indent="-457200">
+              <a:buFont typeface="+mj-lt"/>
+              <a:buAutoNum type="arabicPeriod"/>
+            </a:pPr>
+            <a:r>
+              <a:rPr lang="en-US" sz="2400" dirty="0"/>
+              <a:t>In a browser go to https://tinyurl.com/adbf2025</a:t>
+            </a:r>
+          </a:p>
+          <a:p>
+            <a:pPr lvl="1"/>
+            <a:r>
+              <a:rPr lang="en-US" sz="2000" dirty="0"/>
+              <a:t>Alias for </a:t>
+            </a:r>
+            <a:r>
+              <a:rPr lang="en-US" sz="2000" dirty="0">
                 <a:hlinkClick r:id="rId2"/>
               </a:rPr>
-              <a:t>https://www.jdoodle.com/python3-programming-online</a:t>
+              <a:t>https://codespaces.new/777arc/RADAR-2025-Beamforming-Labs</a:t>
+            </a:r>
+            <a:endParaRPr lang="en-US" sz="2000" dirty="0"/>
+          </a:p>
+          <a:p>
+            <a:pPr marL="457200" indent="-457200">
+              <a:buFont typeface="+mj-lt"/>
+              <a:buAutoNum type="arabicPeriod"/>
+            </a:pPr>
+            <a:r>
+              <a:rPr lang="en-US" sz="2400" dirty="0"/>
+              <a:t>Click</a:t>
+            </a:r>
+          </a:p>
+          <a:p>
+            <a:pPr marL="457200" indent="-457200">
+              <a:buFont typeface="+mj-lt"/>
+              <a:buAutoNum type="arabicPeriod"/>
+            </a:pPr>
+            <a:r>
+              <a:rPr lang="en-US" sz="2400" dirty="0"/>
+              <a:t>It will create a new </a:t>
+            </a:r>
+            <a:r>
+              <a:rPr lang="en-US" sz="2400" dirty="0" err="1"/>
+              <a:t>Codespace</a:t>
+            </a:r>
+            <a:r>
+              <a:rPr lang="en-US" sz="2400" dirty="0"/>
+              <a:t> in your GitHub account, with all of our code, RF recordings, and it will use a prebuilt </a:t>
+            </a:r>
+            <a:r>
+              <a:rPr lang="en-US" sz="2400" dirty="0" err="1"/>
+              <a:t>linux</a:t>
+            </a:r>
+            <a:r>
+              <a:rPr lang="en-US" sz="2400" dirty="0"/>
+              <a:t> image we set up just for this lab</a:t>
+            </a:r>
+          </a:p>
+          <a:p>
+            <a:pPr marL="457200" indent="-457200">
+              <a:buFont typeface="+mj-lt"/>
+              <a:buAutoNum type="arabicPeriod"/>
+            </a:pPr>
+            <a:r>
+              <a:rPr lang="en-US" sz="2400" dirty="0"/>
+              <a:t>After a minute you should see a web-based </a:t>
+            </a:r>
+            <a:r>
+              <a:rPr lang="en-US" sz="2400" dirty="0" err="1"/>
+              <a:t>VSCode</a:t>
+            </a:r>
+            <a:r>
+              <a:rPr lang="en-US" sz="2400" dirty="0"/>
+              <a:t> interface, and the Labs on the left</a:t>
+            </a:r>
+          </a:p>
+          <a:p>
+            <a:pPr marL="457200" indent="-457200">
+              <a:buFont typeface="+mj-lt"/>
+              <a:buAutoNum type="arabicPeriod"/>
+            </a:pPr>
+            <a:r>
+              <a:rPr lang="en-US" sz="2400" dirty="0"/>
+              <a:t>Use the .</a:t>
+            </a:r>
+            <a:r>
+              <a:rPr lang="en-US" sz="2400" dirty="0" err="1"/>
+              <a:t>ipynb</a:t>
+            </a:r>
+            <a:r>
+              <a:rPr lang="en-US" sz="2400" dirty="0"/>
+              <a:t> versions of the lab code (images wont show up with the .</a:t>
+            </a:r>
+            <a:r>
+              <a:rPr lang="en-US" sz="2400" dirty="0" err="1"/>
+              <a:t>py</a:t>
+            </a:r>
+            <a:r>
+              <a:rPr lang="en-US" sz="2400" dirty="0"/>
+              <a:t> version)</a:t>
+            </a:r>
+          </a:p>
+          <a:p>
+            <a:pPr marL="457200" indent="-457200">
+              <a:buFont typeface="+mj-lt"/>
+              <a:buAutoNum type="arabicPeriod"/>
+            </a:pPr>
+            <a:r>
+              <a:rPr lang="en-US" sz="2400" dirty="0"/>
+              <a:t>Open Lab 0 -&gt; </a:t>
+            </a:r>
+            <a:r>
+              <a:rPr lang="en-US" sz="2400" dirty="0" err="1"/>
+              <a:t>main.ipynb</a:t>
             </a:r>
             <a:endParaRPr lang="en-US" sz="2400" dirty="0"/>
           </a:p>
           <a:p>
+            <a:pPr marL="457200" indent="-457200">
+              <a:buFont typeface="+mj-lt"/>
+              <a:buAutoNum type="arabicPeriod"/>
+            </a:pPr>
             <a:r>
               <a:rPr lang="en-US" sz="2400" dirty="0"/>
-              <a:t>Copy the Python code for the lab into the browser text box</a:t>
-            </a:r>
-          </a:p>
-          <a:p>
+              <a:t>In the upper right, Select Kernel and </a:t>
+            </a:r>
+            <a:r>
+              <a:rPr lang="en-US" sz="2400" b="1" dirty="0"/>
+              <a:t>choose Python 3.12</a:t>
+            </a:r>
+          </a:p>
+          <a:p>
+            <a:pPr marL="457200" indent="-457200">
+              <a:buFont typeface="+mj-lt"/>
+              <a:buAutoNum type="arabicPeriod"/>
+            </a:pPr>
             <a:r>
               <a:rPr lang="en-US" sz="2400" dirty="0"/>
-              <a:t>Click the            button on the right, and add matplotlib and packaging</a:t>
-            </a:r>
-          </a:p>
-          <a:p>
+              <a:t>For each lab, there's a </a:t>
+            </a:r>
+            <a:r>
+              <a:rPr lang="en-US" sz="2400" b="1" dirty="0"/>
+              <a:t>Run All </a:t>
+            </a:r>
             <a:r>
               <a:rPr lang="en-US" sz="2400" dirty="0"/>
-              <a:t>Run the code with </a:t>
-            </a:r>
-          </a:p>
-          <a:p>
+              <a:t>button at the top, or control-enter is a hotkey for running an individual code cell</a:t>
+            </a:r>
+          </a:p>
+          <a:p>
+            <a:pPr marL="457200" indent="-457200">
+              <a:buFont typeface="+mj-lt"/>
+              <a:buAutoNum type="arabicPeriod"/>
+            </a:pPr>
             <a:r>
               <a:rPr lang="en-US" sz="2400" dirty="0"/>
-              <a:t>Note that the lab with the interactive slider app wont work</a:t>
-            </a:r>
-          </a:p>
-          <a:p>
+              <a:t>At any time you can stop or delete </a:t>
+            </a:r>
+            <a:r>
+              <a:rPr lang="en-US" sz="2400" dirty="0" err="1"/>
+              <a:t>codespaces</a:t>
+            </a:r>
             <a:r>
               <a:rPr lang="en-US" sz="2400" dirty="0"/>
-              <a:t>This icon on the right lets you upload the .</a:t>
-            </a:r>
-            <a:r>
-              <a:rPr lang="en-US" sz="2400" dirty="0" err="1"/>
-              <a:t>npy</a:t>
-            </a:r>
-            <a:r>
-              <a:rPr lang="en-US" sz="2400" dirty="0"/>
-              <a:t> recording files </a:t>
-            </a:r>
-          </a:p>
-          <a:p>
-            <a:r>
-              <a:rPr lang="en-US" sz="2400" dirty="0"/>
-              <a:t>TODO- THE LIMIT IS 1 MB SO MAKE SMALLER VERSIONS!</a:t>
+              <a:t> at https://github.com/codespaces/</a:t>
             </a:r>
           </a:p>
         </p:txBody>
       </p:sp>
       <p:pic>
         <p:nvPicPr>
-          <p:cNvPr id="5" name="Picture 4">
-            <a:extLst>
-              <a:ext uri="{FF2B5EF4-FFF2-40B4-BE49-F238E27FC236}">
-                <a16:creationId xmlns:a16="http://schemas.microsoft.com/office/drawing/2014/main" id="{CE4BF52F-CB47-490E-9FFB-FEA565673386}"/>
+          <p:cNvPr id="6" name="Picture 5">
+            <a:extLst>
+              <a:ext uri="{FF2B5EF4-FFF2-40B4-BE49-F238E27FC236}">
+                <a16:creationId xmlns:a16="http://schemas.microsoft.com/office/drawing/2014/main" id="{0C5D2354-1B61-4002-B2E1-9C199AB135C0}"/>
               </a:ext>
             </a:extLst>
           </p:cNvPr>
@@ -3833,98 +4229,8 @@
         </p:blipFill>
         <p:spPr>
           <a:xfrm>
-            <a:off x="8730928" y="3467539"/>
-            <a:ext cx="876422" cy="743054"/>
-          </a:xfrm>
-          <a:prstGeom prst="rect">
-            <a:avLst/>
-          </a:prstGeom>
-        </p:spPr>
-      </p:pic>
-      <p:pic>
-        <p:nvPicPr>
-          <p:cNvPr id="7" name="Picture 6">
-            <a:extLst>
-              <a:ext uri="{FF2B5EF4-FFF2-40B4-BE49-F238E27FC236}">
-                <a16:creationId xmlns:a16="http://schemas.microsoft.com/office/drawing/2014/main" id="{B7B0CC63-EF80-4FA9-99CC-BF0E8BB599CB}"/>
-              </a:ext>
-            </a:extLst>
-          </p:cNvPr>
-          <p:cNvPicPr>
-            <a:picLocks noChangeAspect="1"/>
-          </p:cNvPicPr>
-          <p:nvPr/>
-        </p:nvPicPr>
-        <p:blipFill>
-          <a:blip r:embed="rId4"/>
-          <a:stretch>
-            <a:fillRect/>
-          </a:stretch>
-        </p:blipFill>
-        <p:spPr>
-          <a:xfrm>
-            <a:off x="3461071" y="3143201"/>
-            <a:ext cx="1351537" cy="505610"/>
-          </a:xfrm>
-          <a:prstGeom prst="rect">
-            <a:avLst/>
-          </a:prstGeom>
-        </p:spPr>
-      </p:pic>
-      <p:pic>
-        <p:nvPicPr>
-          <p:cNvPr id="9" name="Picture 8">
-            <a:extLst>
-              <a:ext uri="{FF2B5EF4-FFF2-40B4-BE49-F238E27FC236}">
-                <a16:creationId xmlns:a16="http://schemas.microsoft.com/office/drawing/2014/main" id="{A1465DE2-74A0-44BB-86F9-5E90A7F6AAEC}"/>
-              </a:ext>
-            </a:extLst>
-          </p:cNvPr>
-          <p:cNvPicPr>
-            <a:picLocks noChangeAspect="1"/>
-          </p:cNvPicPr>
-          <p:nvPr/>
-        </p:nvPicPr>
-        <p:blipFill>
-          <a:blip r:embed="rId5"/>
-          <a:stretch>
-            <a:fillRect/>
-          </a:stretch>
-        </p:blipFill>
-        <p:spPr>
-          <a:xfrm>
-            <a:off x="2373345" y="2653439"/>
-            <a:ext cx="530112" cy="558012"/>
-          </a:xfrm>
-          <a:prstGeom prst="rect">
-            <a:avLst/>
-          </a:prstGeom>
-        </p:spPr>
-      </p:pic>
-      <p:pic>
-        <p:nvPicPr>
-          <p:cNvPr id="11" name="Picture 10">
-            <a:extLst>
-              <a:ext uri="{FF2B5EF4-FFF2-40B4-BE49-F238E27FC236}">
-                <a16:creationId xmlns:a16="http://schemas.microsoft.com/office/drawing/2014/main" id="{DBC09463-A239-4691-BCF4-7EE8BA004518}"/>
-              </a:ext>
-            </a:extLst>
-          </p:cNvPr>
-          <p:cNvPicPr>
-            <a:picLocks noChangeAspect="1"/>
-          </p:cNvPicPr>
-          <p:nvPr/>
-        </p:nvPicPr>
-        <p:blipFill>
-          <a:blip r:embed="rId6"/>
-          <a:stretch>
-            <a:fillRect/>
-          </a:stretch>
-        </p:blipFill>
-        <p:spPr>
-          <a:xfrm>
-            <a:off x="9818655" y="2690464"/>
-            <a:ext cx="1351537" cy="569613"/>
+            <a:off x="1679544" y="2655906"/>
+            <a:ext cx="2156590" cy="457458"/>
           </a:xfrm>
           <a:prstGeom prst="rect">
             <a:avLst/>

</xml_diff>